<commit_message>
Conversao de Imagens sendo ajustado
</commit_message>
<xml_diff>
--- a/slide_padrão_medicina.pptx
+++ b/slide_padrão_medicina.pptx
@@ -320,7 +320,7 @@
             <a:fld id="{1D8BD707-D9CF-40AE-B4C6-C98DA3205C09}" type="datetimeFigureOut">
               <a:rPr lang="en-US" smtClean="0"/>
               <a:pPr/>
-              <a:t>5/27/2025</a:t>
+              <a:t>5/28/2025</a:t>
             </a:fld>
             <a:endParaRPr lang="en-US"/>
           </a:p>
@@ -485,7 +485,7 @@
             <a:fld id="{1D8BD707-D9CF-40AE-B4C6-C98DA3205C09}" type="datetimeFigureOut">
               <a:rPr lang="en-US" smtClean="0"/>
               <a:pPr/>
-              <a:t>5/27/2025</a:t>
+              <a:t>5/28/2025</a:t>
             </a:fld>
             <a:endParaRPr lang="en-US"/>
           </a:p>
@@ -660,7 +660,7 @@
             <a:fld id="{1D8BD707-D9CF-40AE-B4C6-C98DA3205C09}" type="datetimeFigureOut">
               <a:rPr lang="en-US" smtClean="0"/>
               <a:pPr/>
-              <a:t>5/27/2025</a:t>
+              <a:t>5/28/2025</a:t>
             </a:fld>
             <a:endParaRPr lang="en-US"/>
           </a:p>
@@ -825,7 +825,7 @@
             <a:fld id="{1D8BD707-D9CF-40AE-B4C6-C98DA3205C09}" type="datetimeFigureOut">
               <a:rPr lang="en-US" smtClean="0"/>
               <a:pPr/>
-              <a:t>5/27/2025</a:t>
+              <a:t>5/28/2025</a:t>
             </a:fld>
             <a:endParaRPr lang="en-US"/>
           </a:p>
@@ -1067,7 +1067,7 @@
             <a:fld id="{1D8BD707-D9CF-40AE-B4C6-C98DA3205C09}" type="datetimeFigureOut">
               <a:rPr lang="en-US" smtClean="0"/>
               <a:pPr/>
-              <a:t>5/27/2025</a:t>
+              <a:t>5/28/2025</a:t>
             </a:fld>
             <a:endParaRPr lang="en-US"/>
           </a:p>
@@ -1349,7 +1349,7 @@
             <a:fld id="{1D8BD707-D9CF-40AE-B4C6-C98DA3205C09}" type="datetimeFigureOut">
               <a:rPr lang="en-US" smtClean="0"/>
               <a:pPr/>
-              <a:t>5/27/2025</a:t>
+              <a:t>5/28/2025</a:t>
             </a:fld>
             <a:endParaRPr lang="en-US"/>
           </a:p>
@@ -1765,7 +1765,7 @@
             <a:fld id="{1D8BD707-D9CF-40AE-B4C6-C98DA3205C09}" type="datetimeFigureOut">
               <a:rPr lang="en-US" smtClean="0"/>
               <a:pPr/>
-              <a:t>5/27/2025</a:t>
+              <a:t>5/28/2025</a:t>
             </a:fld>
             <a:endParaRPr lang="en-US"/>
           </a:p>
@@ -1879,7 +1879,7 @@
             <a:fld id="{1D8BD707-D9CF-40AE-B4C6-C98DA3205C09}" type="datetimeFigureOut">
               <a:rPr lang="en-US" smtClean="0"/>
               <a:pPr/>
-              <a:t>5/27/2025</a:t>
+              <a:t>5/28/2025</a:t>
             </a:fld>
             <a:endParaRPr lang="en-US"/>
           </a:p>
@@ -1971,7 +1971,7 @@
             <a:fld id="{1D8BD707-D9CF-40AE-B4C6-C98DA3205C09}" type="datetimeFigureOut">
               <a:rPr lang="en-US" smtClean="0"/>
               <a:pPr/>
-              <a:t>5/27/2025</a:t>
+              <a:t>5/28/2025</a:t>
             </a:fld>
             <a:endParaRPr lang="en-US"/>
           </a:p>
@@ -2243,7 +2243,7 @@
             <a:fld id="{1D8BD707-D9CF-40AE-B4C6-C98DA3205C09}" type="datetimeFigureOut">
               <a:rPr lang="en-US" smtClean="0"/>
               <a:pPr/>
-              <a:t>5/27/2025</a:t>
+              <a:t>5/28/2025</a:t>
             </a:fld>
             <a:endParaRPr lang="en-US"/>
           </a:p>
@@ -2492,7 +2492,7 @@
             <a:fld id="{1D8BD707-D9CF-40AE-B4C6-C98DA3205C09}" type="datetimeFigureOut">
               <a:rPr lang="en-US" smtClean="0"/>
               <a:pPr/>
-              <a:t>5/27/2025</a:t>
+              <a:t>5/28/2025</a:t>
             </a:fld>
             <a:endParaRPr lang="en-US"/>
           </a:p>
@@ -2700,7 +2700,7 @@
             <a:fld id="{1D8BD707-D9CF-40AE-B4C6-C98DA3205C09}" type="datetimeFigureOut">
               <a:rPr lang="en-US" smtClean="0"/>
               <a:pPr/>
-              <a:t>5/27/2025</a:t>
+              <a:t>5/28/2025</a:t>
             </a:fld>
             <a:endParaRPr lang="en-US"/>
           </a:p>
@@ -4743,7 +4743,7 @@
         <p:spPr>
           <a:xfrm>
             <a:off x="14583188" y="5317550"/>
-            <a:ext cx="2616961" cy="1899302"/>
+            <a:ext cx="2616961" cy="1424814"/>
           </a:xfrm>
           <a:prstGeom prst="rect">
             <a:avLst/>
@@ -4770,7 +4770,7 @@
                 <a:cs typeface="Arial Bold"/>
                 <a:sym typeface="Arial Bold"/>
               </a:rPr>
-              <a:t>{{R$_TM_EXAMES_LABORATORIAIS}}</a:t>
+              <a:t>{{TM_EXAMES_LABORATORIAIS}}</a:t>
             </a:r>
           </a:p>
         </p:txBody>
@@ -5631,6 +5631,53 @@
                 <a:sym typeface="Arial"/>
               </a:rPr>
               <a:t>*meta 80%</a:t>
+            </a:r>
+          </a:p>
+        </p:txBody>
+      </p:sp>
+      <p:sp>
+        <p:nvSpPr>
+          <p:cNvPr id="67" name="TextBox 49">
+            <a:extLst>
+              <a:ext uri="{FF2B5EF4-FFF2-40B4-BE49-F238E27FC236}">
+                <a16:creationId xmlns:a16="http://schemas.microsoft.com/office/drawing/2014/main" id="{7DC150FB-D0DD-41FB-9A0B-0E127245F24D}"/>
+              </a:ext>
+            </a:extLst>
+          </p:cNvPr>
+          <p:cNvSpPr txBox="1"/>
+          <p:nvPr/>
+        </p:nvSpPr>
+        <p:spPr>
+          <a:xfrm>
+            <a:off x="13716000" y="5323389"/>
+            <a:ext cx="2616961" cy="475836"/>
+          </a:xfrm>
+          <a:prstGeom prst="rect">
+            <a:avLst/>
+          </a:prstGeom>
+        </p:spPr>
+        <p:txBody>
+          <a:bodyPr lIns="0" tIns="0" rIns="0" bIns="0" rtlCol="0" anchor="t">
+            <a:spAutoFit/>
+          </a:bodyPr>
+          <a:lstStyle/>
+          <a:p>
+            <a:pPr algn="ctr">
+              <a:lnSpc>
+                <a:spcPts val="3687"/>
+              </a:lnSpc>
+            </a:pPr>
+            <a:r>
+              <a:rPr lang="en-US" sz="3414" b="1" spc="-54" dirty="0">
+                <a:solidFill>
+                  <a:srgbClr val="141519"/>
+                </a:solidFill>
+                <a:latin typeface="Arial Bold"/>
+                <a:ea typeface="Arial Bold"/>
+                <a:cs typeface="Arial Bold"/>
+                <a:sym typeface="Arial Bold"/>
+              </a:rPr>
+              <a:t>R$</a:t>
             </a:r>
           </a:p>
         </p:txBody>

</xml_diff>